<commit_message>
add issue#1 missing asset
</commit_message>
<xml_diff>
--- a/assets/pycobytes.pptx
+++ b/assets/pycobytes.pptx
@@ -12,6 +12,7 @@
     <p:sldId id="260" r:id="rId6"/>
     <p:sldId id="262" r:id="rId7"/>
     <p:sldId id="259" r:id="rId8"/>
+    <p:sldId id="263" r:id="rId9"/>
   </p:sldIdLst>
   <p:sldSz cx="12192000" cy="6858000"/>
   <p:notesSz cx="6858000" cy="9144000"/>
@@ -4926,6 +4927,514 @@
 </p:sld>
 </file>
 
+<file path=ppt/slides/slide7.xml><?xml version="1.0" encoding="utf-8"?>
+<p:sld xmlns:a="http://schemas.openxmlformats.org/drawingml/2006/main" xmlns:r="http://schemas.openxmlformats.org/officeDocument/2006/relationships" xmlns:p="http://schemas.openxmlformats.org/presentationml/2006/main">
+  <p:cSld>
+    <p:spTree>
+      <p:nvGrpSpPr>
+        <p:cNvPr id="1" name=""/>
+        <p:cNvGrpSpPr/>
+        <p:nvPr/>
+      </p:nvGrpSpPr>
+      <p:grpSpPr>
+        <a:xfrm>
+          <a:off x="0" y="0"/>
+          <a:ext cx="0" cy="0"/>
+          <a:chOff x="0" y="0"/>
+          <a:chExt cx="0" cy="0"/>
+        </a:xfrm>
+      </p:grpSpPr>
+      <p:sp>
+        <p:nvSpPr>
+          <p:cNvPr id="3" name="Rectangle 2"/>
+          <p:cNvSpPr/>
+          <p:nvPr/>
+        </p:nvSpPr>
+        <p:spPr>
+          <a:xfrm>
+            <a:off x="4885267" y="3107267"/>
+            <a:ext cx="2319866" cy="1028700"/>
+          </a:xfrm>
+          <a:prstGeom prst="rect">
+            <a:avLst/>
+          </a:prstGeom>
+          <a:solidFill>
+            <a:srgbClr val="011627"/>
+          </a:solidFill>
+        </p:spPr>
+        <p:style>
+          <a:lnRef idx="2">
+            <a:schemeClr val="accent1">
+              <a:shade val="50000"/>
+            </a:schemeClr>
+          </a:lnRef>
+          <a:fillRef idx="1">
+            <a:schemeClr val="accent1"/>
+          </a:fillRef>
+          <a:effectRef idx="0">
+            <a:schemeClr val="accent1"/>
+          </a:effectRef>
+          <a:fontRef idx="minor">
+            <a:schemeClr val="lt1"/>
+          </a:fontRef>
+        </p:style>
+        <p:txBody>
+          <a:bodyPr rtlCol="0" anchor="ctr"/>
+          <a:lstStyle/>
+          <a:p>
+            <a:pPr algn="ctr"/>
+            <a:endParaRPr lang="en-GB"/>
+          </a:p>
+        </p:txBody>
+      </p:sp>
+      <p:sp>
+        <p:nvSpPr>
+          <p:cNvPr id="2" name="Rectangle 1"/>
+          <p:cNvSpPr>
+            <a:spLocks noChangeArrowheads="1"/>
+          </p:cNvSpPr>
+          <p:nvPr/>
+        </p:nvSpPr>
+        <p:spPr bwMode="auto">
+          <a:xfrm>
+            <a:off x="5186296" y="3194987"/>
+            <a:ext cx="1819409" cy="468026"/>
+          </a:xfrm>
+          <a:prstGeom prst="rect">
+            <a:avLst/>
+          </a:prstGeom>
+          <a:solidFill>
+            <a:srgbClr val="011627"/>
+          </a:solidFill>
+          <a:ln>
+            <a:noFill/>
+          </a:ln>
+          <a:effectLst/>
+          <a:extLst>
+            <a:ext uri="{91240B29-F687-4F45-9708-019B960494DF}">
+              <a14:hiddenLine xmlns:a14="http://schemas.microsoft.com/office/drawing/2010/main" w="9525">
+                <a:solidFill>
+                  <a:schemeClr val="tx1"/>
+                </a:solidFill>
+                <a:miter lim="800000"/>
+                <a:headEnd/>
+                <a:tailEnd/>
+              </a14:hiddenLine>
+            </a:ext>
+            <a:ext uri="{AF507438-7753-43E0-B8FC-AC1667EBCBE1}">
+              <a14:hiddenEffects xmlns:a14="http://schemas.microsoft.com/office/drawing/2010/main">
+                <a:effectLst>
+                  <a:outerShdw dist="35921" dir="2700000" algn="ctr" rotWithShape="0">
+                    <a:schemeClr val="bg2"/>
+                  </a:outerShdw>
+                </a:effectLst>
+              </a14:hiddenEffects>
+            </a:ext>
+          </a:extLst>
+        </p:spPr>
+        <p:txBody>
+          <a:bodyPr vert="horz" wrap="none" lIns="0" tIns="79350" rIns="0" bIns="79350" numCol="1" anchor="ctr" anchorCtr="0" compatLnSpc="1">
+            <a:prstTxWarp prst="textNoShape">
+              <a:avLst/>
+            </a:prstTxWarp>
+            <a:spAutoFit/>
+          </a:bodyPr>
+          <a:lstStyle/>
+          <a:p>
+            <a:pPr marL="0" marR="0" lvl="0" indent="0" algn="l" defTabSz="914400" rtl="0" eaLnBrk="0" fontAlgn="base" latinLnBrk="0" hangingPunct="0">
+              <a:lnSpc>
+                <a:spcPct val="100000"/>
+              </a:lnSpc>
+              <a:spcBef>
+                <a:spcPct val="0"/>
+              </a:spcBef>
+              <a:spcAft>
+                <a:spcPct val="0"/>
+              </a:spcAft>
+              <a:buClrTx/>
+              <a:buSzTx/>
+              <a:buFontTx/>
+              <a:buNone/>
+              <a:tabLst/>
+            </a:pPr>
+            <a:r>
+              <a:rPr kumimoji="0" lang="en-US" altLang="en-US" sz="1000" b="0" i="0" u="none" strike="noStrike" cap="none" normalizeH="0" baseline="0" dirty="0" smtClean="0">
+                <a:ln>
+                  <a:noFill/>
+                </a:ln>
+                <a:solidFill>
+                  <a:srgbClr val="7FDBCA"/>
+                </a:solidFill>
+                <a:effectLst/>
+                <a:latin typeface="Consolas" panose="020B0609020204030204" pitchFamily="49" charset="0"/>
+              </a:rPr>
+              <a:t>for</a:t>
+            </a:r>
+            <a:r>
+              <a:rPr kumimoji="0" lang="en-US" altLang="en-US" sz="1000" b="0" i="0" u="none" strike="noStrike" cap="none" normalizeH="0" baseline="0" dirty="0" smtClean="0">
+                <a:ln>
+                  <a:noFill/>
+                </a:ln>
+                <a:solidFill>
+                  <a:srgbClr val="D6DEEB"/>
+                </a:solidFill>
+                <a:effectLst/>
+                <a:latin typeface="Consolas" panose="020B0609020204030204" pitchFamily="49" charset="0"/>
+              </a:rPr>
+              <a:t> x </a:t>
+            </a:r>
+            <a:r>
+              <a:rPr kumimoji="0" lang="en-US" altLang="en-US" sz="1000" b="0" i="0" u="none" strike="noStrike" cap="none" normalizeH="0" baseline="0" dirty="0" smtClean="0">
+                <a:ln>
+                  <a:noFill/>
+                </a:ln>
+                <a:solidFill>
+                  <a:srgbClr val="7FDBCA"/>
+                </a:solidFill>
+                <a:effectLst/>
+                <a:latin typeface="Consolas" panose="020B0609020204030204" pitchFamily="49" charset="0"/>
+              </a:rPr>
+              <a:t>in</a:t>
+            </a:r>
+            <a:r>
+              <a:rPr kumimoji="0" lang="en-US" altLang="en-US" sz="1000" b="0" i="0" u="none" strike="noStrike" cap="none" normalizeH="0" baseline="0" dirty="0" smtClean="0">
+                <a:ln>
+                  <a:noFill/>
+                </a:ln>
+                <a:solidFill>
+                  <a:srgbClr val="D6DEEB"/>
+                </a:solidFill>
+                <a:effectLst/>
+                <a:latin typeface="Consolas" panose="020B0609020204030204" pitchFamily="49" charset="0"/>
+              </a:rPr>
+              <a:t> numbers</a:t>
+            </a:r>
+            <a:r>
+              <a:rPr kumimoji="0" lang="en-US" altLang="en-US" sz="1000" b="0" i="0" u="none" strike="noStrike" cap="none" normalizeH="0" baseline="0" dirty="0" smtClean="0">
+                <a:ln>
+                  <a:noFill/>
+                </a:ln>
+                <a:solidFill>
+                  <a:schemeClr val="tx2">
+                    <a:lumMod val="75000"/>
+                  </a:schemeClr>
+                </a:solidFill>
+                <a:effectLst/>
+                <a:latin typeface="Consolas" panose="020B0609020204030204" pitchFamily="49" charset="0"/>
+              </a:rPr>
+              <a:t>:</a:t>
+            </a:r>
+          </a:p>
+          <a:p>
+            <a:pPr marL="0" marR="0" lvl="0" indent="0" algn="l" defTabSz="914400" rtl="0" eaLnBrk="0" fontAlgn="base" latinLnBrk="0" hangingPunct="0">
+              <a:lnSpc>
+                <a:spcPct val="100000"/>
+              </a:lnSpc>
+              <a:spcBef>
+                <a:spcPct val="0"/>
+              </a:spcBef>
+              <a:spcAft>
+                <a:spcPct val="0"/>
+              </a:spcAft>
+              <a:buClrTx/>
+              <a:buSzTx/>
+              <a:buFontTx/>
+              <a:buNone/>
+              <a:tabLst/>
+            </a:pPr>
+            <a:r>
+              <a:rPr lang="en-US" altLang="en-US" sz="1000" dirty="0">
+                <a:solidFill>
+                  <a:srgbClr val="C792EA"/>
+                </a:solidFill>
+                <a:latin typeface="Consolas" panose="020B0609020204030204" pitchFamily="49" charset="0"/>
+              </a:rPr>
+              <a:t> </a:t>
+            </a:r>
+            <a:r>
+              <a:rPr lang="en-US" altLang="en-US" sz="1000" dirty="0" smtClean="0">
+                <a:solidFill>
+                  <a:srgbClr val="C792EA"/>
+                </a:solidFill>
+                <a:latin typeface="Consolas" panose="020B0609020204030204" pitchFamily="49" charset="0"/>
+              </a:rPr>
+              <a:t>   </a:t>
+            </a:r>
+            <a:r>
+              <a:rPr kumimoji="0" lang="en-US" altLang="en-US" sz="1000" b="0" i="0" u="none" strike="noStrike" cap="none" normalizeH="0" baseline="0" dirty="0" err="1" smtClean="0">
+                <a:ln>
+                  <a:noFill/>
+                </a:ln>
+                <a:solidFill>
+                  <a:schemeClr val="tx2">
+                    <a:lumMod val="75000"/>
+                  </a:schemeClr>
+                </a:solidFill>
+                <a:effectLst/>
+                <a:latin typeface="Consolas" panose="020B0609020204030204" pitchFamily="49" charset="0"/>
+              </a:rPr>
+              <a:t>result.append</a:t>
+            </a:r>
+            <a:r>
+              <a:rPr kumimoji="0" lang="en-US" altLang="en-US" sz="1000" b="0" i="0" u="none" strike="noStrike" cap="none" normalizeH="0" baseline="0" dirty="0" smtClean="0">
+                <a:ln>
+                  <a:noFill/>
+                </a:ln>
+                <a:solidFill>
+                  <a:schemeClr val="tx2">
+                    <a:lumMod val="75000"/>
+                  </a:schemeClr>
+                </a:solidFill>
+                <a:effectLst/>
+                <a:latin typeface="Consolas" panose="020B0609020204030204" pitchFamily="49" charset="0"/>
+              </a:rPr>
+              <a:t>(</a:t>
+            </a:r>
+            <a:r>
+              <a:rPr kumimoji="0" lang="en-US" altLang="en-US" sz="1000" b="0" i="0" u="none" strike="noStrike" cap="none" normalizeH="0" baseline="0" dirty="0" smtClean="0">
+                <a:ln>
+                  <a:noFill/>
+                </a:ln>
+                <a:solidFill>
+                  <a:srgbClr val="D6DEEB"/>
+                </a:solidFill>
+                <a:effectLst/>
+                <a:latin typeface="Consolas" panose="020B0609020204030204" pitchFamily="49" charset="0"/>
+              </a:rPr>
+              <a:t>x </a:t>
+            </a:r>
+            <a:r>
+              <a:rPr kumimoji="0" lang="en-US" altLang="en-US" sz="1000" b="0" i="0" u="none" strike="noStrike" cap="none" normalizeH="0" baseline="0" dirty="0" smtClean="0">
+                <a:ln>
+                  <a:noFill/>
+                </a:ln>
+                <a:solidFill>
+                  <a:srgbClr val="7FDBCA"/>
+                </a:solidFill>
+                <a:effectLst/>
+                <a:latin typeface="Consolas" panose="020B0609020204030204" pitchFamily="49" charset="0"/>
+              </a:rPr>
+              <a:t>**</a:t>
+            </a:r>
+            <a:r>
+              <a:rPr kumimoji="0" lang="en-US" altLang="en-US" sz="1000" b="0" i="0" u="none" strike="noStrike" cap="none" normalizeH="0" baseline="0" dirty="0" smtClean="0">
+                <a:ln>
+                  <a:noFill/>
+                </a:ln>
+                <a:solidFill>
+                  <a:srgbClr val="D6DEEB"/>
+                </a:solidFill>
+                <a:effectLst/>
+                <a:latin typeface="Consolas" panose="020B0609020204030204" pitchFamily="49" charset="0"/>
+              </a:rPr>
+              <a:t> </a:t>
+            </a:r>
+            <a:r>
+              <a:rPr kumimoji="0" lang="en-US" altLang="en-US" sz="1000" b="0" i="0" u="none" strike="noStrike" cap="none" normalizeH="0" baseline="0" dirty="0" smtClean="0">
+                <a:ln>
+                  <a:noFill/>
+                </a:ln>
+                <a:solidFill>
+                  <a:srgbClr val="F78C6C"/>
+                </a:solidFill>
+                <a:effectLst/>
+                <a:latin typeface="Consolas" panose="020B0609020204030204" pitchFamily="49" charset="0"/>
+              </a:rPr>
+              <a:t>2</a:t>
+            </a:r>
+            <a:r>
+              <a:rPr kumimoji="0" lang="en-US" altLang="en-US" sz="1000" b="0" i="0" u="none" strike="noStrike" cap="none" normalizeH="0" baseline="0" dirty="0" smtClean="0">
+                <a:ln>
+                  <a:noFill/>
+                </a:ln>
+                <a:solidFill>
+                  <a:schemeClr val="tx2">
+                    <a:lumMod val="75000"/>
+                  </a:schemeClr>
+                </a:solidFill>
+                <a:effectLst/>
+                <a:latin typeface="Consolas" panose="020B0609020204030204" pitchFamily="49" charset="0"/>
+              </a:rPr>
+              <a:t>)</a:t>
+            </a:r>
+            <a:r>
+              <a:rPr kumimoji="0" lang="en-US" altLang="en-US" sz="800" b="0" i="0" u="none" strike="noStrike" cap="none" normalizeH="0" baseline="0" dirty="0" smtClean="0">
+                <a:ln>
+                  <a:noFill/>
+                </a:ln>
+                <a:solidFill>
+                  <a:schemeClr val="tx1"/>
+                </a:solidFill>
+                <a:effectLst/>
+                <a:latin typeface="Consolas" panose="020B0609020204030204" pitchFamily="49" charset="0"/>
+              </a:rPr>
+              <a:t> </a:t>
+            </a:r>
+            <a:endParaRPr kumimoji="0" lang="en-US" altLang="en-US" sz="1800" b="0" i="0" u="none" strike="noStrike" cap="none" normalizeH="0" baseline="0" dirty="0" smtClean="0">
+              <a:ln>
+                <a:noFill/>
+              </a:ln>
+              <a:solidFill>
+                <a:schemeClr val="tx1"/>
+              </a:solidFill>
+              <a:effectLst/>
+              <a:latin typeface="Consolas" panose="020B0609020204030204" pitchFamily="49" charset="0"/>
+            </a:endParaRPr>
+          </a:p>
+        </p:txBody>
+      </p:sp>
+      <p:sp>
+        <p:nvSpPr>
+          <p:cNvPr id="6" name="Freeform 5"/>
+          <p:cNvSpPr/>
+          <p:nvPr/>
+        </p:nvSpPr>
+        <p:spPr>
+          <a:xfrm>
+            <a:off x="5101167" y="3530600"/>
+            <a:ext cx="1515533" cy="489618"/>
+          </a:xfrm>
+          <a:custGeom>
+            <a:avLst/>
+            <a:gdLst>
+              <a:gd name="connsiteX0" fmla="*/ 1515533 w 1515533"/>
+              <a:gd name="connsiteY0" fmla="*/ 169333 h 452104"/>
+              <a:gd name="connsiteX1" fmla="*/ 817033 w 1515533"/>
+              <a:gd name="connsiteY1" fmla="*/ 448733 h 452104"/>
+              <a:gd name="connsiteX2" fmla="*/ 0 w 1515533"/>
+              <a:gd name="connsiteY2" fmla="*/ 0 h 452104"/>
+              <a:gd name="connsiteX0" fmla="*/ 1515533 w 1515533"/>
+              <a:gd name="connsiteY0" fmla="*/ 169333 h 489618"/>
+              <a:gd name="connsiteX1" fmla="*/ 757767 w 1515533"/>
+              <a:gd name="connsiteY1" fmla="*/ 486833 h 489618"/>
+              <a:gd name="connsiteX2" fmla="*/ 0 w 1515533"/>
+              <a:gd name="connsiteY2" fmla="*/ 0 h 489618"/>
+              <a:gd name="connsiteX0" fmla="*/ 1515533 w 1515533"/>
+              <a:gd name="connsiteY0" fmla="*/ 169333 h 489618"/>
+              <a:gd name="connsiteX1" fmla="*/ 757767 w 1515533"/>
+              <a:gd name="connsiteY1" fmla="*/ 486833 h 489618"/>
+              <a:gd name="connsiteX2" fmla="*/ 0 w 1515533"/>
+              <a:gd name="connsiteY2" fmla="*/ 0 h 489618"/>
+            </a:gdLst>
+            <a:ahLst/>
+            <a:cxnLst>
+              <a:cxn ang="0">
+                <a:pos x="connsiteX0" y="connsiteY0"/>
+              </a:cxn>
+              <a:cxn ang="0">
+                <a:pos x="connsiteX1" y="connsiteY1"/>
+              </a:cxn>
+              <a:cxn ang="0">
+                <a:pos x="connsiteX2" y="connsiteY2"/>
+              </a:cxn>
+            </a:cxnLst>
+            <a:rect l="l" t="t" r="r" b="b"/>
+            <a:pathLst>
+              <a:path w="1515533" h="489618">
+                <a:moveTo>
+                  <a:pt x="1515533" y="169333"/>
+                </a:moveTo>
+                <a:cubicBezTo>
+                  <a:pt x="1292577" y="323144"/>
+                  <a:pt x="1010356" y="515055"/>
+                  <a:pt x="757767" y="486833"/>
+                </a:cubicBezTo>
+                <a:cubicBezTo>
+                  <a:pt x="505178" y="458611"/>
+                  <a:pt x="282222" y="320322"/>
+                  <a:pt x="0" y="0"/>
+                </a:cubicBezTo>
+              </a:path>
+            </a:pathLst>
+          </a:custGeom>
+          <a:noFill/>
+          <a:ln w="19050">
+            <a:solidFill>
+              <a:schemeClr val="accent6"/>
+            </a:solidFill>
+            <a:tailEnd type="arrow"/>
+          </a:ln>
+        </p:spPr>
+        <p:style>
+          <a:lnRef idx="2">
+            <a:schemeClr val="accent1">
+              <a:shade val="50000"/>
+            </a:schemeClr>
+          </a:lnRef>
+          <a:fillRef idx="1">
+            <a:schemeClr val="accent1"/>
+          </a:fillRef>
+          <a:effectRef idx="0">
+            <a:schemeClr val="accent1"/>
+          </a:effectRef>
+          <a:fontRef idx="minor">
+            <a:schemeClr val="lt1"/>
+          </a:fontRef>
+        </p:style>
+        <p:txBody>
+          <a:bodyPr rtlCol="0" anchor="ctr"/>
+          <a:lstStyle/>
+          <a:p>
+            <a:pPr algn="ctr"/>
+            <a:endParaRPr lang="en-GB"/>
+          </a:p>
+        </p:txBody>
+      </p:sp>
+      <p:cxnSp>
+        <p:nvCxnSpPr>
+          <p:cNvPr id="8" name="Straight Connector 7"/>
+          <p:cNvCxnSpPr/>
+          <p:nvPr/>
+        </p:nvCxnSpPr>
+        <p:spPr>
+          <a:xfrm>
+            <a:off x="6421967" y="3611033"/>
+            <a:ext cx="486833" cy="0"/>
+          </a:xfrm>
+          <a:prstGeom prst="line">
+            <a:avLst/>
+          </a:prstGeom>
+          <a:ln w="12700">
+            <a:solidFill>
+              <a:schemeClr val="accent6"/>
+            </a:solidFill>
+          </a:ln>
+        </p:spPr>
+        <p:style>
+          <a:lnRef idx="1">
+            <a:schemeClr val="accent1"/>
+          </a:lnRef>
+          <a:fillRef idx="0">
+            <a:schemeClr val="accent1"/>
+          </a:fillRef>
+          <a:effectRef idx="0">
+            <a:schemeClr val="accent1"/>
+          </a:effectRef>
+          <a:fontRef idx="minor">
+            <a:schemeClr val="tx1"/>
+          </a:fontRef>
+        </p:style>
+      </p:cxnSp>
+    </p:spTree>
+    <p:extLst>
+      <p:ext uri="{BB962C8B-B14F-4D97-AF65-F5344CB8AC3E}">
+        <p14:creationId xmlns:p14="http://schemas.microsoft.com/office/powerpoint/2010/main" val="3734903375"/>
+      </p:ext>
+    </p:extLst>
+  </p:cSld>
+  <p:clrMapOvr>
+    <a:masterClrMapping/>
+  </p:clrMapOvr>
+  <p:timing>
+    <p:tnLst>
+      <p:par>
+        <p:cTn id="1" dur="indefinite" restart="never" nodeType="tmRoot"/>
+      </p:par>
+    </p:tnLst>
+  </p:timing>
+</p:sld>
+</file>
+
 <file path=ppt/theme/theme1.xml><?xml version="1.0" encoding="utf-8"?>
 <a:theme xmlns:a="http://schemas.openxmlformats.org/drawingml/2006/main" name="Nova">
   <a:themeElements>

</xml_diff>